<commit_message>
Refactor: Migrate to V2 architecture, remove V1 legacy code
</commit_message>
<xml_diff>
--- a/mss_ai_ppt_sample_assets/backend/data/templates/mss_executive_v2.pptx
+++ b/mss_ai_ppt_sample_assets/backend/data/templates/mss_executive_v2.pptx
@@ -3156,7 +3156,7 @@
               <a:defRPr sz="1800" b="0"/>
             </a:pPr>
             <a:r>
-              <a:t>客户：{{CUSTOMER_NAME}}</a:t>
+              <a:t>{{CUSTOMER_LABEL}}</a:t>
             </a:r>
           </a:p>
         </p:txBody>
@@ -3187,7 +3187,7 @@
               <a:defRPr sz="1400" b="0"/>
             </a:pPr>
             <a:r>
-              <a:t>周期：{{PERIOD}}</a:t>
+              <a:t>{{PERIOD_LABEL}}</a:t>
             </a:r>
           </a:p>
         </p:txBody>
@@ -3218,7 +3218,7 @@
               <a:defRPr sz="1200" b="0"/>
             </a:pPr>
             <a:r>
-              <a:t>保密等级：{{CONFIDENTIALITY}}</a:t>
+              <a:t>{{CONFIDENTIALITY_LABEL}}</a:t>
             </a:r>
           </a:p>
         </p:txBody>
@@ -3249,7 +3249,7 @@
               <a:defRPr sz="1000" b="0"/>
             </a:pPr>
             <a:r>
-              <a:t>生成时间：{{GENERATED_AT}}</a:t>
+              <a:t>{{GENERATED_AT_LABEL}}</a:t>
             </a:r>
           </a:p>
         </p:txBody>
@@ -3346,25 +3346,25 @@
         </p:nvSpPr>
         <p:spPr>
           <a:xfrm>
-            <a:off x="457200" y="1828800"/>
-            <a:ext cx="2286000" cy="274320"/>
-          </a:xfrm>
-          <a:prstGeom prst="rect">
-            <a:avLst/>
-          </a:prstGeom>
-          <a:noFill/>
-        </p:spPr>
-        <p:txBody>
-          <a:bodyPr wrap="square">
-            <a:spAutoFit/>
-          </a:bodyPr>
-          <a:lstStyle/>
-          <a:p>
-            <a:pPr>
-              <a:defRPr sz="1000" b="0"/>
-            </a:pPr>
-            <a:r>
-              <a:t>告警总数</a:t>
+            <a:off x="457200" y="1737360"/>
+            <a:ext cx="11430000" cy="1097280"/>
+          </a:xfrm>
+          <a:prstGeom prst="rect">
+            <a:avLst/>
+          </a:prstGeom>
+          <a:noFill/>
+        </p:spPr>
+        <p:txBody>
+          <a:bodyPr wrap="square">
+            <a:spAutoFit/>
+          </a:bodyPr>
+          <a:lstStyle/>
+          <a:p>
+            <a:pPr>
+              <a:defRPr sz="1100" b="0"/>
+            </a:pPr>
+            <a:r>
+              <a:t>{{KPI_SECTION}}</a:t>
             </a:r>
           </a:p>
         </p:txBody>
@@ -3377,25 +3377,25 @@
         </p:nvSpPr>
         <p:spPr>
           <a:xfrm>
-            <a:off x="457200" y="2103120"/>
-            <a:ext cx="2286000" cy="457200"/>
-          </a:xfrm>
-          <a:prstGeom prst="rect">
-            <a:avLst/>
-          </a:prstGeom>
-          <a:noFill/>
-        </p:spPr>
-        <p:txBody>
-          <a:bodyPr wrap="square">
-            <a:spAutoFit/>
-          </a:bodyPr>
-          <a:lstStyle/>
-          <a:p>
-            <a:pPr>
-              <a:defRPr sz="2400"/>
-            </a:pPr>
-            <a:r>
-              <a:t>{{KPI_ALERTS_TOTAL}}</a:t>
+            <a:off x="457200" y="3017520"/>
+            <a:ext cx="10972800" cy="1371600"/>
+          </a:xfrm>
+          <a:prstGeom prst="rect">
+            <a:avLst/>
+          </a:prstGeom>
+          <a:noFill/>
+        </p:spPr>
+        <p:txBody>
+          <a:bodyPr wrap="square">
+            <a:spAutoFit/>
+          </a:bodyPr>
+          <a:lstStyle/>
+          <a:p>
+            <a:pPr>
+              <a:defRPr sz="1200" b="0"/>
+            </a:pPr>
+            <a:r>
+              <a:t>{{SUMMARY_PARAGRAPH}}</a:t>
             </a:r>
           </a:p>
         </p:txBody>
@@ -3403,223 +3403,6 @@
       <p:sp>
         <p:nvSpPr>
           <p:cNvPr id="6" name="TextBox 5"/>
-          <p:cNvSpPr txBox="1"/>
-          <p:nvPr/>
-        </p:nvSpPr>
-        <p:spPr>
-          <a:xfrm>
-            <a:off x="2926080" y="1828800"/>
-            <a:ext cx="2286000" cy="274320"/>
-          </a:xfrm>
-          <a:prstGeom prst="rect">
-            <a:avLst/>
-          </a:prstGeom>
-          <a:noFill/>
-        </p:spPr>
-        <p:txBody>
-          <a:bodyPr wrap="square">
-            <a:spAutoFit/>
-          </a:bodyPr>
-          <a:lstStyle/>
-          <a:p>
-            <a:pPr>
-              <a:defRPr sz="1000" b="0"/>
-            </a:pPr>
-            <a:r>
-              <a:t>高危告警</a:t>
-            </a:r>
-          </a:p>
-        </p:txBody>
-      </p:sp>
-      <p:sp>
-        <p:nvSpPr>
-          <p:cNvPr id="7" name="TextBox 6"/>
-          <p:cNvSpPr txBox="1"/>
-          <p:nvPr/>
-        </p:nvSpPr>
-        <p:spPr>
-          <a:xfrm>
-            <a:off x="2926080" y="2103120"/>
-            <a:ext cx="2286000" cy="457200"/>
-          </a:xfrm>
-          <a:prstGeom prst="rect">
-            <a:avLst/>
-          </a:prstGeom>
-          <a:noFill/>
-        </p:spPr>
-        <p:txBody>
-          <a:bodyPr wrap="square">
-            <a:spAutoFit/>
-          </a:bodyPr>
-          <a:lstStyle/>
-          <a:p>
-            <a:pPr>
-              <a:defRPr sz="2400"/>
-            </a:pPr>
-            <a:r>
-              <a:t>{{KPI_ALERTS_HIGH}}</a:t>
-            </a:r>
-          </a:p>
-        </p:txBody>
-      </p:sp>
-      <p:sp>
-        <p:nvSpPr>
-          <p:cNvPr id="8" name="TextBox 7"/>
-          <p:cNvSpPr txBox="1"/>
-          <p:nvPr/>
-        </p:nvSpPr>
-        <p:spPr>
-          <a:xfrm>
-            <a:off x="5394960" y="1828800"/>
-            <a:ext cx="2286000" cy="274320"/>
-          </a:xfrm>
-          <a:prstGeom prst="rect">
-            <a:avLst/>
-          </a:prstGeom>
-          <a:noFill/>
-        </p:spPr>
-        <p:txBody>
-          <a:bodyPr wrap="square">
-            <a:spAutoFit/>
-          </a:bodyPr>
-          <a:lstStyle/>
-          <a:p>
-            <a:pPr>
-              <a:defRPr sz="1000" b="0"/>
-            </a:pPr>
-            <a:r>
-              <a:t>高危事件</a:t>
-            </a:r>
-          </a:p>
-        </p:txBody>
-      </p:sp>
-      <p:sp>
-        <p:nvSpPr>
-          <p:cNvPr id="9" name="TextBox 8"/>
-          <p:cNvSpPr txBox="1"/>
-          <p:nvPr/>
-        </p:nvSpPr>
-        <p:spPr>
-          <a:xfrm>
-            <a:off x="5394960" y="2103120"/>
-            <a:ext cx="2286000" cy="457200"/>
-          </a:xfrm>
-          <a:prstGeom prst="rect">
-            <a:avLst/>
-          </a:prstGeom>
-          <a:noFill/>
-        </p:spPr>
-        <p:txBody>
-          <a:bodyPr wrap="square">
-            <a:spAutoFit/>
-          </a:bodyPr>
-          <a:lstStyle/>
-          <a:p>
-            <a:pPr>
-              <a:defRPr sz="2400"/>
-            </a:pPr>
-            <a:r>
-              <a:t>{{KPI_INCIDENTS_HIGH}}</a:t>
-            </a:r>
-          </a:p>
-        </p:txBody>
-      </p:sp>
-      <p:sp>
-        <p:nvSpPr>
-          <p:cNvPr id="10" name="TextBox 9"/>
-          <p:cNvSpPr txBox="1"/>
-          <p:nvPr/>
-        </p:nvSpPr>
-        <p:spPr>
-          <a:xfrm>
-            <a:off x="7863840" y="1828800"/>
-            <a:ext cx="2286000" cy="274320"/>
-          </a:xfrm>
-          <a:prstGeom prst="rect">
-            <a:avLst/>
-          </a:prstGeom>
-          <a:noFill/>
-        </p:spPr>
-        <p:txBody>
-          <a:bodyPr wrap="square">
-            <a:spAutoFit/>
-          </a:bodyPr>
-          <a:lstStyle/>
-          <a:p>
-            <a:pPr>
-              <a:defRPr sz="1000" b="0"/>
-            </a:pPr>
-            <a:r>
-              <a:t>平均MTTR</a:t>
-            </a:r>
-          </a:p>
-        </p:txBody>
-      </p:sp>
-      <p:sp>
-        <p:nvSpPr>
-          <p:cNvPr id="11" name="TextBox 10"/>
-          <p:cNvSpPr txBox="1"/>
-          <p:nvPr/>
-        </p:nvSpPr>
-        <p:spPr>
-          <a:xfrm>
-            <a:off x="7863840" y="2103120"/>
-            <a:ext cx="2286000" cy="457200"/>
-          </a:xfrm>
-          <a:prstGeom prst="rect">
-            <a:avLst/>
-          </a:prstGeom>
-          <a:noFill/>
-        </p:spPr>
-        <p:txBody>
-          <a:bodyPr wrap="square">
-            <a:spAutoFit/>
-          </a:bodyPr>
-          <a:lstStyle/>
-          <a:p>
-            <a:pPr>
-              <a:defRPr sz="2400"/>
-            </a:pPr>
-            <a:r>
-              <a:t>{{KPI_MTTR_HOURS}}</a:t>
-            </a:r>
-          </a:p>
-        </p:txBody>
-      </p:sp>
-      <p:sp>
-        <p:nvSpPr>
-          <p:cNvPr id="12" name="TextBox 11"/>
-          <p:cNvSpPr txBox="1"/>
-          <p:nvPr/>
-        </p:nvSpPr>
-        <p:spPr>
-          <a:xfrm>
-            <a:off x="457200" y="2926080"/>
-            <a:ext cx="10972800" cy="1371600"/>
-          </a:xfrm>
-          <a:prstGeom prst="rect">
-            <a:avLst/>
-          </a:prstGeom>
-          <a:noFill/>
-        </p:spPr>
-        <p:txBody>
-          <a:bodyPr wrap="square">
-            <a:spAutoFit/>
-          </a:bodyPr>
-          <a:lstStyle/>
-          <a:p>
-            <a:pPr>
-              <a:defRPr sz="1200"/>
-            </a:pPr>
-            <a:r>
-              <a:t>{{SUMMARY_PARAGRAPH}}</a:t>
-            </a:r>
-          </a:p>
-        </p:txBody>
-      </p:sp>
-      <p:sp>
-        <p:nvSpPr>
-          <p:cNvPr id="13" name="TextBox 12"/>
           <p:cNvSpPr txBox="1"/>
           <p:nvPr/>
         </p:nvSpPr>
@@ -3643,14 +3426,14 @@
               <a:defRPr sz="1400" b="1"/>
             </a:pPr>
             <a:r>
-              <a:t>关键洞察</a:t>
-            </a:r>
-          </a:p>
-        </p:txBody>
-      </p:sp>
-      <p:sp>
-        <p:nvSpPr>
-          <p:cNvPr id="14" name="TextBox 13"/>
+              <a:t>{{KEY_INSIGHTS_TITLE}}</a:t>
+            </a:r>
+          </a:p>
+        </p:txBody>
+      </p:sp>
+      <p:sp>
+        <p:nvSpPr>
+          <p:cNvPr id="7" name="TextBox 6"/>
           <p:cNvSpPr txBox="1"/>
           <p:nvPr/>
         </p:nvSpPr>
@@ -3671,7 +3454,7 @@
           <a:lstStyle/>
           <a:p>
             <a:pPr>
-              <a:defRPr sz="1100"/>
+              <a:defRPr sz="1100" b="0"/>
             </a:pPr>
             <a:r>
               <a:t>{{KEY_INSIGHTS}}</a:t>
@@ -3758,7 +3541,7 @@
               <a:defRPr sz="1400" b="1"/>
             </a:pPr>
             <a:r>
-              <a:t>趋势分析</a:t>
+              <a:t>{{TREND_SECTION_TITLE}}</a:t>
             </a:r>
           </a:p>
         </p:txBody>
@@ -3786,7 +3569,7 @@
           <a:lstStyle/>
           <a:p>
             <a:pPr>
-              <a:defRPr sz="1100"/>
+              <a:defRPr sz="1100" b="0"/>
             </a:pPr>
             <a:r>
               <a:t>{{TREND_ANALYSIS}}</a:t>
@@ -3820,7 +3603,7 @@
               <a:defRPr sz="1400" b="1"/>
             </a:pPr>
             <a:r>
-              <a:t>Top告警类别</a:t>
+              <a:t>{{TOP_CATEGORIES_TITLE}}</a:t>
             </a:r>
           </a:p>
         </p:txBody>
@@ -3848,7 +3631,7 @@
           <a:lstStyle/>
           <a:p>
             <a:pPr>
-              <a:defRPr sz="1100"/>
+              <a:defRPr sz="1100" b="0"/>
             </a:pPr>
             <a:r>
               <a:t>{{TOP_CATEGORIES_LIST}}</a:t>
@@ -3882,7 +3665,7 @@
               <a:defRPr sz="1400" b="1"/>
             </a:pPr>
             <a:r>
-              <a:t>类别分析</a:t>
+              <a:t>{{CATEGORIES_INSIGHT_TITLE}}</a:t>
             </a:r>
           </a:p>
         </p:txBody>
@@ -3910,7 +3693,7 @@
           <a:lstStyle/>
           <a:p>
             <a:pPr>
-              <a:defRPr sz="1100"/>
+              <a:defRPr sz="1100" b="0"/>
             </a:pPr>
             <a:r>
               <a:t>{{TOP_CATEGORIES_INSIGHT}}</a:t>
@@ -3944,7 +3727,7 @@
               <a:defRPr sz="1400" b="1"/>
             </a:pPr>
             <a:r>
-              <a:t>环比对比</a:t>
+              <a:t>{{MOM_TITLE}}</a:t>
             </a:r>
           </a:p>
         </p:txBody>
@@ -3972,7 +3755,7 @@
           <a:lstStyle/>
           <a:p>
             <a:pPr>
-              <a:defRPr sz="1100"/>
+              <a:defRPr sz="1100" b="0"/>
             </a:pPr>
             <a:r>
               <a:t>{{MOM_COMPARISON}}</a:t>
@@ -4059,7 +3842,7 @@
               <a:defRPr sz="1400" b="1"/>
             </a:pPr>
             <a:r>
-              <a:t>事件概述</a:t>
+              <a:t>{{INCIDENT_OVERVIEW_TITLE}}</a:t>
             </a:r>
           </a:p>
         </p:txBody>
@@ -4087,7 +3870,7 @@
           <a:lstStyle/>
           <a:p>
             <a:pPr>
-              <a:defRPr sz="1100"/>
+              <a:defRPr sz="1100" b="0"/>
             </a:pPr>
             <a:r>
               <a:t>{{INCIDENT_SUMMARY}}</a:t>
@@ -4121,7 +3904,7 @@
               <a:defRPr sz="1400" b="1"/>
             </a:pPr>
             <a:r>
-              <a:t>重点事件详情</a:t>
+              <a:t>{{INCIDENT_DETAILS_TITLE}}</a:t>
             </a:r>
           </a:p>
         </p:txBody>
@@ -4149,7 +3932,7 @@
           <a:lstStyle/>
           <a:p>
             <a:pPr>
-              <a:defRPr sz="1000"/>
+              <a:defRPr sz="1000" b="0"/>
             </a:pPr>
             <a:r>
               <a:t>{{INCIDENT_DETAILS}}</a:t>
@@ -4183,7 +3966,7 @@
               <a:defRPr sz="1400" b="1"/>
             </a:pPr>
             <a:r>
-              <a:t>安全洞察</a:t>
+              <a:t>{{INCIDENT_INSIGHT_TITLE}}</a:t>
             </a:r>
           </a:p>
         </p:txBody>
@@ -4211,7 +3994,7 @@
           <a:lstStyle/>
           <a:p>
             <a:pPr>
-              <a:defRPr sz="1100"/>
+              <a:defRPr sz="1100" b="0"/>
             </a:pPr>
             <a:r>
               <a:t>{{INCIDENT_INSIGHT}}</a:t>
@@ -4280,7 +4063,69 @@
         </p:nvSpPr>
         <p:spPr>
           <a:xfrm>
-            <a:off x="457200" y="1097280"/>
+            <a:off x="457200" y="914400"/>
+            <a:ext cx="10972800" cy="365760"/>
+          </a:xfrm>
+          <a:prstGeom prst="rect">
+            <a:avLst/>
+          </a:prstGeom>
+          <a:noFill/>
+        </p:spPr>
+        <p:txBody>
+          <a:bodyPr wrap="square">
+            <a:spAutoFit/>
+          </a:bodyPr>
+          <a:lstStyle/>
+          <a:p>
+            <a:pPr>
+              <a:defRPr sz="1400" b="1"/>
+            </a:pPr>
+            <a:r>
+              <a:t>{{VULN_STATS_TITLE}}</a:t>
+            </a:r>
+          </a:p>
+        </p:txBody>
+      </p:sp>
+      <p:sp>
+        <p:nvSpPr>
+          <p:cNvPr id="4" name="TextBox 3"/>
+          <p:cNvSpPr txBox="1"/>
+          <p:nvPr/>
+        </p:nvSpPr>
+        <p:spPr>
+          <a:xfrm>
+            <a:off x="457200" y="1280160"/>
+            <a:ext cx="10972800" cy="457200"/>
+          </a:xfrm>
+          <a:prstGeom prst="rect">
+            <a:avLst/>
+          </a:prstGeom>
+          <a:noFill/>
+        </p:spPr>
+        <p:txBody>
+          <a:bodyPr wrap="square">
+            <a:spAutoFit/>
+          </a:bodyPr>
+          <a:lstStyle/>
+          <a:p>
+            <a:pPr>
+              <a:defRPr sz="1100" b="0"/>
+            </a:pPr>
+            <a:r>
+              <a:t>{{VULN_STATS}}</a:t>
+            </a:r>
+          </a:p>
+        </p:txBody>
+      </p:sp>
+      <p:sp>
+        <p:nvSpPr>
+          <p:cNvPr id="5" name="TextBox 4"/>
+          <p:cNvSpPr txBox="1"/>
+          <p:nvPr/>
+        </p:nvSpPr>
+        <p:spPr>
+          <a:xfrm>
+            <a:off x="457200" y="1828800"/>
             <a:ext cx="5486400" cy="365760"/>
           </a:xfrm>
           <a:prstGeom prst="rect">
@@ -4298,35 +4143,35 @@
               <a:defRPr sz="1400" b="1"/>
             </a:pPr>
             <a:r>
-              <a:t>漏洞态势</a:t>
-            </a:r>
-          </a:p>
-        </p:txBody>
-      </p:sp>
-      <p:sp>
-        <p:nvSpPr>
-          <p:cNvPr id="4" name="TextBox 3"/>
-          <p:cNvSpPr txBox="1"/>
-          <p:nvPr/>
-        </p:nvSpPr>
-        <p:spPr>
-          <a:xfrm>
-            <a:off x="457200" y="1463040"/>
-            <a:ext cx="5486400" cy="1097280"/>
-          </a:xfrm>
-          <a:prstGeom prst="rect">
-            <a:avLst/>
-          </a:prstGeom>
-          <a:noFill/>
-        </p:spPr>
-        <p:txBody>
-          <a:bodyPr wrap="square">
-            <a:spAutoFit/>
-          </a:bodyPr>
-          <a:lstStyle/>
-          <a:p>
-            <a:pPr>
-              <a:defRPr sz="1100"/>
+              <a:t>{{VULN_OVERVIEW_TITLE}}</a:t>
+            </a:r>
+          </a:p>
+        </p:txBody>
+      </p:sp>
+      <p:sp>
+        <p:nvSpPr>
+          <p:cNvPr id="6" name="TextBox 5"/>
+          <p:cNvSpPr txBox="1"/>
+          <p:nvPr/>
+        </p:nvSpPr>
+        <p:spPr>
+          <a:xfrm>
+            <a:off x="457200" y="2194560"/>
+            <a:ext cx="5486400" cy="914400"/>
+          </a:xfrm>
+          <a:prstGeom prst="rect">
+            <a:avLst/>
+          </a:prstGeom>
+          <a:noFill/>
+        </p:spPr>
+        <p:txBody>
+          <a:bodyPr wrap="square">
+            <a:spAutoFit/>
+          </a:bodyPr>
+          <a:lstStyle/>
+          <a:p>
+            <a:pPr>
+              <a:defRPr sz="1100" b="0"/>
             </a:pPr>
             <a:r>
               <a:t>{{VULN_OVERVIEW}}</a:t>
@@ -4336,13 +4181,13 @@
       </p:sp>
       <p:sp>
         <p:nvSpPr>
-          <p:cNvPr id="5" name="TextBox 4"/>
-          <p:cNvSpPr txBox="1"/>
-          <p:nvPr/>
-        </p:nvSpPr>
-        <p:spPr>
-          <a:xfrm>
-            <a:off x="6400800" y="1097280"/>
+          <p:cNvPr id="7" name="TextBox 6"/>
+          <p:cNvSpPr txBox="1"/>
+          <p:nvPr/>
+        </p:nvSpPr>
+        <p:spPr>
+          <a:xfrm>
+            <a:off x="6400800" y="1828800"/>
             <a:ext cx="5029200" cy="365760"/>
           </a:xfrm>
           <a:prstGeom prst="rect">
@@ -4360,35 +4205,35 @@
               <a:defRPr sz="1400" b="1"/>
             </a:pPr>
             <a:r>
-              <a:t>暴露面统计</a:t>
-            </a:r>
-          </a:p>
-        </p:txBody>
-      </p:sp>
-      <p:sp>
-        <p:nvSpPr>
-          <p:cNvPr id="6" name="TextBox 5"/>
-          <p:cNvSpPr txBox="1"/>
-          <p:nvPr/>
-        </p:nvSpPr>
-        <p:spPr>
-          <a:xfrm>
-            <a:off x="6400800" y="1463040"/>
-            <a:ext cx="5029200" cy="457200"/>
-          </a:xfrm>
-          <a:prstGeom prst="rect">
-            <a:avLst/>
-          </a:prstGeom>
-          <a:noFill/>
-        </p:spPr>
-        <p:txBody>
-          <a:bodyPr wrap="square">
-            <a:spAutoFit/>
-          </a:bodyPr>
-          <a:lstStyle/>
-          <a:p>
-            <a:pPr>
-              <a:defRPr sz="1100"/>
+              <a:t>{{EXPOSURE_STATS_TITLE}}</a:t>
+            </a:r>
+          </a:p>
+        </p:txBody>
+      </p:sp>
+      <p:sp>
+        <p:nvSpPr>
+          <p:cNvPr id="8" name="TextBox 7"/>
+          <p:cNvSpPr txBox="1"/>
+          <p:nvPr/>
+        </p:nvSpPr>
+        <p:spPr>
+          <a:xfrm>
+            <a:off x="6400800" y="2194560"/>
+            <a:ext cx="5029200" cy="914400"/>
+          </a:xfrm>
+          <a:prstGeom prst="rect">
+            <a:avLst/>
+          </a:prstGeom>
+          <a:noFill/>
+        </p:spPr>
+        <p:txBody>
+          <a:bodyPr wrap="square">
+            <a:spAutoFit/>
+          </a:bodyPr>
+          <a:lstStyle/>
+          <a:p>
+            <a:pPr>
+              <a:defRPr sz="1100" b="0"/>
             </a:pPr>
             <a:r>
               <a:t>{{EXPOSURE_STATS}}</a:t>
@@ -4398,13 +4243,13 @@
       </p:sp>
       <p:sp>
         <p:nvSpPr>
-          <p:cNvPr id="7" name="TextBox 6"/>
-          <p:cNvSpPr txBox="1"/>
-          <p:nvPr/>
-        </p:nvSpPr>
-        <p:spPr>
-          <a:xfrm>
-            <a:off x="457200" y="2743200"/>
+          <p:cNvPr id="9" name="TextBox 8"/>
+          <p:cNvSpPr txBox="1"/>
+          <p:nvPr/>
+        </p:nvSpPr>
+        <p:spPr>
+          <a:xfrm>
+            <a:off x="457200" y="3291840"/>
             <a:ext cx="10972800" cy="365760"/>
           </a:xfrm>
           <a:prstGeom prst="rect">
@@ -4422,45 +4267,45 @@
               <a:defRPr sz="1400" b="1"/>
             </a:pPr>
             <a:r>
-              <a:t>Top CVE分析</a:t>
-            </a:r>
-          </a:p>
-        </p:txBody>
-      </p:sp>
-      <p:sp>
-        <p:nvSpPr>
-          <p:cNvPr id="8" name="TextBox 7"/>
-          <p:cNvSpPr txBox="1"/>
-          <p:nvPr/>
-        </p:nvSpPr>
-        <p:spPr>
-          <a:xfrm>
-            <a:off x="457200" y="3108960"/>
-            <a:ext cx="10972800" cy="1645920"/>
-          </a:xfrm>
-          <a:prstGeom prst="rect">
-            <a:avLst/>
-          </a:prstGeom>
-          <a:noFill/>
-        </p:spPr>
-        <p:txBody>
-          <a:bodyPr wrap="square">
-            <a:spAutoFit/>
-          </a:bodyPr>
-          <a:lstStyle/>
-          <a:p>
-            <a:pPr>
-              <a:defRPr sz="1000"/>
-            </a:pPr>
-            <a:r>
-              <a:t>{{TOP_CVE_ANALYSIS}}</a:t>
-            </a:r>
-          </a:p>
-        </p:txBody>
-      </p:sp>
-      <p:sp>
-        <p:nvSpPr>
-          <p:cNvPr id="9" name="TextBox 8"/>
+              <a:t>{{TOP_CVE_TITLE}}</a:t>
+            </a:r>
+          </a:p>
+        </p:txBody>
+      </p:sp>
+      <p:sp>
+        <p:nvSpPr>
+          <p:cNvPr id="10" name="TextBox 9"/>
+          <p:cNvSpPr txBox="1"/>
+          <p:nvPr/>
+        </p:nvSpPr>
+        <p:spPr>
+          <a:xfrm>
+            <a:off x="457200" y="3657600"/>
+            <a:ext cx="10972800" cy="1097280"/>
+          </a:xfrm>
+          <a:prstGeom prst="rect">
+            <a:avLst/>
+          </a:prstGeom>
+          <a:noFill/>
+        </p:spPr>
+        <p:txBody>
+          <a:bodyPr wrap="square">
+            <a:spAutoFit/>
+          </a:bodyPr>
+          <a:lstStyle/>
+          <a:p>
+            <a:pPr>
+              <a:defRPr sz="1000" b="0"/>
+            </a:pPr>
+            <a:r>
+              <a:t>{{TOP_CVE_LIST}}</a:t>
+            </a:r>
+          </a:p>
+        </p:txBody>
+      </p:sp>
+      <p:sp>
+        <p:nvSpPr>
+          <p:cNvPr id="11" name="TextBox 10"/>
           <p:cNvSpPr txBox="1"/>
           <p:nvPr/>
         </p:nvSpPr>
@@ -4484,35 +4329,66 @@
               <a:defRPr sz="1400" b="1"/>
             </a:pPr>
             <a:r>
-              <a:t>暴露面分析</a:t>
-            </a:r>
-          </a:p>
-        </p:txBody>
-      </p:sp>
-      <p:sp>
-        <p:nvSpPr>
-          <p:cNvPr id="10" name="TextBox 9"/>
+              <a:t>{{CVE_ANALYSIS_TITLE}}</a:t>
+            </a:r>
+          </a:p>
+        </p:txBody>
+      </p:sp>
+      <p:sp>
+        <p:nvSpPr>
+          <p:cNvPr id="12" name="TextBox 11"/>
           <p:cNvSpPr txBox="1"/>
           <p:nvPr/>
         </p:nvSpPr>
         <p:spPr>
           <a:xfrm>
             <a:off x="457200" y="5303520"/>
-            <a:ext cx="10972800" cy="1371600"/>
-          </a:xfrm>
-          <a:prstGeom prst="rect">
-            <a:avLst/>
-          </a:prstGeom>
-          <a:noFill/>
-        </p:spPr>
-        <p:txBody>
-          <a:bodyPr wrap="square">
-            <a:spAutoFit/>
-          </a:bodyPr>
-          <a:lstStyle/>
-          <a:p>
-            <a:pPr>
-              <a:defRPr sz="1100"/>
+            <a:ext cx="10972800" cy="914400"/>
+          </a:xfrm>
+          <a:prstGeom prst="rect">
+            <a:avLst/>
+          </a:prstGeom>
+          <a:noFill/>
+        </p:spPr>
+        <p:txBody>
+          <a:bodyPr wrap="square">
+            <a:spAutoFit/>
+          </a:bodyPr>
+          <a:lstStyle/>
+          <a:p>
+            <a:pPr>
+              <a:defRPr sz="1000" b="0"/>
+            </a:pPr>
+            <a:r>
+              <a:t>{{TOP_CVE_ANALYSIS}}</a:t>
+            </a:r>
+          </a:p>
+        </p:txBody>
+      </p:sp>
+      <p:sp>
+        <p:nvSpPr>
+          <p:cNvPr id="13" name="TextBox 12"/>
+          <p:cNvSpPr txBox="1"/>
+          <p:nvPr/>
+        </p:nvSpPr>
+        <p:spPr>
+          <a:xfrm>
+            <a:off x="457200" y="6309360"/>
+            <a:ext cx="10972800" cy="457200"/>
+          </a:xfrm>
+          <a:prstGeom prst="rect">
+            <a:avLst/>
+          </a:prstGeom>
+          <a:noFill/>
+        </p:spPr>
+        <p:txBody>
+          <a:bodyPr wrap="square">
+            <a:spAutoFit/>
+          </a:bodyPr>
+          <a:lstStyle/>
+          <a:p>
+            <a:pPr>
+              <a:defRPr sz="900" b="0"/>
             </a:pPr>
             <a:r>
               <a:t>{{EXPOSURE_SUMMARY}}</a:t>
@@ -4599,7 +4475,7 @@
               <a:defRPr sz="1200" b="0"/>
             </a:pPr>
             <a:r>
-              <a:t>云账号数</a:t>
+              <a:t>{{CLOUD_ACCOUNTS_TITLE}}</a:t>
             </a:r>
           </a:p>
         </p:txBody>
@@ -4627,7 +4503,7 @@
           <a:lstStyle/>
           <a:p>
             <a:pPr>
-              <a:defRPr sz="2000"/>
+              <a:defRPr sz="2000" b="0"/>
             </a:pPr>
             <a:r>
               <a:t>{{CLOUD_ACCOUNTS_COUNT}}</a:t>
@@ -4661,7 +4537,7 @@
               <a:defRPr sz="1400" b="1"/>
             </a:pPr>
             <a:r>
-              <a:t>云风险清单</a:t>
+              <a:t>{{CLOUD_RISK_TITLE}}</a:t>
             </a:r>
           </a:p>
         </p:txBody>
@@ -4689,7 +4565,7 @@
           <a:lstStyle/>
           <a:p>
             <a:pPr>
-              <a:defRPr sz="1100"/>
+              <a:defRPr sz="1100" b="0"/>
             </a:pPr>
             <a:r>
               <a:t>{{CLOUD_RISK_LIST}}</a:t>
@@ -4723,7 +4599,7 @@
               <a:defRPr sz="1400" b="1"/>
             </a:pPr>
             <a:r>
-              <a:t>风险分析</a:t>
+              <a:t>{{CLOUD_ANALYSIS_TITLE}}</a:t>
             </a:r>
           </a:p>
         </p:txBody>
@@ -4751,7 +4627,7 @@
           <a:lstStyle/>
           <a:p>
             <a:pPr>
-              <a:defRPr sz="1100"/>
+              <a:defRPr sz="1100" b="0"/>
             </a:pPr>
             <a:r>
               <a:t>{{CLOUD_RISK_SUMMARY}}</a:t>
@@ -4785,7 +4661,7 @@
               <a:defRPr sz="1400" b="1"/>
             </a:pPr>
             <a:r>
-              <a:t>云安全建议</a:t>
+              <a:t>{{CLOUD_REC_TITLE}}</a:t>
             </a:r>
           </a:p>
         </p:txBody>
@@ -4813,7 +4689,7 @@
           <a:lstStyle/>
           <a:p>
             <a:pPr>
-              <a:defRPr sz="1100"/>
+              <a:defRPr sz="1100" b="0"/>
             </a:pPr>
             <a:r>
               <a:t>{{CLOUD_RECOMMENDATIONS}}</a:t>
@@ -4900,7 +4776,7 @@
               <a:defRPr sz="1400" b="1"/>
             </a:pPr>
             <a:r>
-              <a:t>P0 紧急整改（7天内）</a:t>
+              <a:t>{{P0_TITLE}}</a:t>
             </a:r>
           </a:p>
         </p:txBody>
@@ -4928,7 +4804,7 @@
           <a:lstStyle/>
           <a:p>
             <a:pPr>
-              <a:defRPr sz="1100"/>
+              <a:defRPr sz="1100" b="0"/>
             </a:pPr>
             <a:r>
               <a:t>{{P0_ACTIONS}}</a:t>
@@ -4962,7 +4838,7 @@
               <a:defRPr sz="1400" b="1"/>
             </a:pPr>
             <a:r>
-              <a:t>P1 重要整改（30天内）</a:t>
+              <a:t>{{P1_TITLE}}</a:t>
             </a:r>
           </a:p>
         </p:txBody>
@@ -4990,7 +4866,7 @@
           <a:lstStyle/>
           <a:p>
             <a:pPr>
-              <a:defRPr sz="1100"/>
+              <a:defRPr sz="1100" b="0"/>
             </a:pPr>
             <a:r>
               <a:t>{{P1_ACTIONS}}</a:t>
@@ -5024,7 +4900,7 @@
               <a:defRPr sz="1400" b="1"/>
             </a:pPr>
             <a:r>
-              <a:t>中长期安全建设建议</a:t>
+              <a:t>{{STRATEGIC_TITLE}}</a:t>
             </a:r>
           </a:p>
         </p:txBody>
@@ -5052,7 +4928,7 @@
           <a:lstStyle/>
           <a:p>
             <a:pPr>
-              <a:defRPr sz="1100"/>
+              <a:defRPr sz="1100" b="0"/>
             </a:pPr>
             <a:r>
               <a:t>{{STRATEGIC_RECOMMENDATIONS}}</a:t>
@@ -5139,7 +5015,7 @@
               <a:defRPr sz="1400" b="1"/>
             </a:pPr>
             <a:r>
-              <a:t>数据口径说明</a:t>
+              <a:t>{{DATA_SCOPE_TITLE}}</a:t>
             </a:r>
           </a:p>
         </p:txBody>
@@ -5167,7 +5043,7 @@
           <a:lstStyle/>
           <a:p>
             <a:pPr>
-              <a:defRPr sz="1000"/>
+              <a:defRPr sz="1000" b="0"/>
             </a:pPr>
             <a:r>
               <a:t>{{DATA_SCOPE}}</a:t>
@@ -5201,7 +5077,7 @@
               <a:defRPr sz="1400" b="1"/>
             </a:pPr>
             <a:r>
-              <a:t>资产覆盖</a:t>
+              <a:t>{{ASSET_COVERAGE_TITLE}}</a:t>
             </a:r>
           </a:p>
         </p:txBody>
@@ -5229,7 +5105,7 @@
           <a:lstStyle/>
           <a:p>
             <a:pPr>
-              <a:defRPr sz="1000"/>
+              <a:defRPr sz="1000" b="0"/>
             </a:pPr>
             <a:r>
               <a:t>{{ASSET_COVERAGE}}</a:t>
@@ -5263,7 +5139,7 @@
               <a:defRPr sz="1400" b="1"/>
             </a:pPr>
             <a:r>
-              <a:t>SLA说明</a:t>
+              <a:t>{{SLA_TITLE}}</a:t>
             </a:r>
           </a:p>
         </p:txBody>
@@ -5291,7 +5167,7 @@
           <a:lstStyle/>
           <a:p>
             <a:pPr>
-              <a:defRPr sz="1000"/>
+              <a:defRPr sz="1000" b="0"/>
             </a:pPr>
             <a:r>
               <a:t>{{SLA_NOTES}}</a:t>
@@ -5325,7 +5201,7 @@
               <a:defRPr sz="1400" b="1"/>
             </a:pPr>
             <a:r>
-              <a:t>术语解释</a:t>
+              <a:t>{{TERMINOLOGY_TITLE}}</a:t>
             </a:r>
           </a:p>
         </p:txBody>
@@ -5353,7 +5229,7 @@
           <a:lstStyle/>
           <a:p>
             <a:pPr>
-              <a:defRPr sz="1000"/>
+              <a:defRPr sz="1000" b="0"/>
             </a:pPr>
             <a:r>
               <a:t>{{TERMINOLOGY}}</a:t>
@@ -5384,7 +5260,7 @@
           <a:lstStyle/>
           <a:p>
             <a:pPr>
-              <a:defRPr sz="1000"/>
+              <a:defRPr sz="1000" b="0"/>
             </a:pPr>
             <a:r>
               <a:t>{{CONTACT_INFO}}</a:t>

</xml_diff>